<commit_message>
upload the final report
</commit_message>
<xml_diff>
--- a/docs/Solving 0–1 Knapsack via DP, GNN, and RL (DQN).pptx
+++ b/docs/Solving 0–1 Knapsack via DP, GNN, and RL (DQN).pptx
@@ -1,19 +1,19 @@
 
 <file path=ppt/presentation.xml><?xml version="1.0" encoding="utf-8"?>
-<p:presentation xmlns:a="http://schemas.openxmlformats.org/drawingml/2006/main" xmlns:p="http://schemas.openxmlformats.org/presentationml/2006/main" xmlns:r="http://schemas.openxmlformats.org/officeDocument/2006/relationships" firstSlideNum="1">
+<p:presentation xmlns:a="http://schemas.openxmlformats.org/drawingml/2006/main" xmlns:r="http://schemas.openxmlformats.org/officeDocument/2006/relationships" xmlns:p="http://schemas.openxmlformats.org/presentationml/2006/main">
   <p:sldMasterIdLst>
-    <p:sldMasterId id="2147483648" r:id="rId0"/>
+    <p:sldMasterId id="2147483648" r:id="rId1"/>
   </p:sldMasterIdLst>
   <p:sldIdLst>
-    <p:sldId id="256" r:id="rId1"/>
-    <p:sldId id="257" r:id="rId2"/>
-    <p:sldId id="258" r:id="rId3"/>
-    <p:sldId id="259" r:id="rId4"/>
-    <p:sldId id="260" r:id="rId5"/>
-    <p:sldId id="261" r:id="rId6"/>
-    <p:sldId id="262" r:id="rId7"/>
+    <p:sldId id="256" r:id="rId2"/>
+    <p:sldId id="257" r:id="rId3"/>
+    <p:sldId id="258" r:id="rId4"/>
+    <p:sldId id="259" r:id="rId5"/>
+    <p:sldId id="260" r:id="rId6"/>
+    <p:sldId id="261" r:id="rId7"/>
+    <p:sldId id="262" r:id="rId8"/>
   </p:sldIdLst>
-  <p:sldSz cx="12192000" cy="6858000" type="screen16x9"/>
+  <p:sldSz cx="12192000" cy="6858000"/>
   <p:notesSz cx="6858000" cy="9144000"/>
   <p:defaultTextStyle>
     <a:lvl1pPr marL="0" lvl="0" algn="l" defTabSz="914400">
@@ -129,7 +129,7 @@
 </file>
 
 <file path=ppt/slideLayouts/slideLayout1.xml><?xml version="1.0" encoding="utf-8"?>
-<p:sldLayout xmlns:a="http://schemas.openxmlformats.org/drawingml/2006/main" xmlns:p="http://schemas.openxmlformats.org/presentationml/2006/main">
+<p:sldLayout xmlns:a="http://schemas.openxmlformats.org/drawingml/2006/main" xmlns:r="http://schemas.openxmlformats.org/officeDocument/2006/relationships" xmlns:p="http://schemas.openxmlformats.org/presentationml/2006/main">
   <p:cSld name="标题幻灯片">
     <p:spTree>
       <p:nvGrpSpPr>
@@ -149,7 +149,7 @@
         <p:nvSpPr>
           <p:cNvPr id="2" name="标题 1"/>
           <p:cNvSpPr>
-            <a:spLocks noGrp="true"/>
+            <a:spLocks noGrp="1"/>
           </p:cNvSpPr>
           <p:nvPr>
             <p:ph type="ctrTitle"/>
@@ -169,7 +169,6 @@
             </a:lvl1pPr>
           </a:lstStyle>
           <a:p>
-            <a:pPr/>
             <a:r>
               <a:rPr lang="zh-CN"/>
               <a:t>单击此处编辑母版标题样式</a:t>
@@ -182,7 +181,7 @@
         <p:nvSpPr>
           <p:cNvPr id="3" name="副标题 2"/>
           <p:cNvSpPr>
-            <a:spLocks noGrp="true"/>
+            <a:spLocks noGrp="1"/>
           </p:cNvSpPr>
           <p:nvPr>
             <p:ph type="subTitle" idx="1"/>
@@ -235,7 +234,6 @@
             </a:lvl9pPr>
           </a:lstStyle>
           <a:p>
-            <a:pPr/>
             <a:r>
               <a:rPr lang="zh-CN"/>
               <a:t>单击此处编辑母版副标题样式</a:t>
@@ -248,7 +246,7 @@
         <p:nvSpPr>
           <p:cNvPr id="4" name="日期占位符 3"/>
           <p:cNvSpPr>
-            <a:spLocks noGrp="true"/>
+            <a:spLocks noGrp="1"/>
           </p:cNvSpPr>
           <p:nvPr>
             <p:ph type="dt" idx="10"/>
@@ -257,11 +255,11 @@
         <p:spPr/>
         <p:txBody>
           <a:bodyPr/>
-          <a:p>
-            <a:pPr/>
+          <a:lstStyle/>
+          <a:p>
             <a:fld id="{0F7DC6A6-BF1E-4CE5-B3E6-718B8EA0B82A}" type="datetime1">
-              <a:rPr lang="zh-CN"/>
-              <a:t>2022/12/22</a:t>
+              <a:rPr lang="en-US" altLang="zh-CN"/>
+              <a:t>2025/12/16</a:t>
             </a:fld>
             <a:endParaRPr lang="zh-CN"/>
           </a:p>
@@ -271,7 +269,7 @@
         <p:nvSpPr>
           <p:cNvPr id="5" name="页脚占位符 4"/>
           <p:cNvSpPr>
-            <a:spLocks noGrp="true"/>
+            <a:spLocks noGrp="1"/>
           </p:cNvSpPr>
           <p:nvPr>
             <p:ph type="ftr" idx="11"/>
@@ -280,8 +278,8 @@
         <p:spPr/>
         <p:txBody>
           <a:bodyPr/>
-          <a:p>
-            <a:pPr/>
+          <a:lstStyle/>
+          <a:p>
             <a:endParaRPr lang="zh-CN"/>
           </a:p>
         </p:txBody>
@@ -290,7 +288,7 @@
         <p:nvSpPr>
           <p:cNvPr id="6" name="灯片编号占位符 5"/>
           <p:cNvSpPr>
-            <a:spLocks noGrp="true"/>
+            <a:spLocks noGrp="1"/>
           </p:cNvSpPr>
           <p:nvPr>
             <p:ph type="sldNum" idx="12"/>
@@ -299,8 +297,8 @@
         <p:spPr/>
         <p:txBody>
           <a:bodyPr/>
-          <a:p>
-            <a:pPr/>
+          <a:lstStyle/>
+          <a:p>
             <a:fld id="{8FC705DF-EB6A-4429-A9CF-8086C29D54D9}" type="slidenum">
               <a:rPr lang="zh-CN"/>
               <a:t>‹#›</a:t>
@@ -318,11 +316,11 @@
 </file>
 
 <file path=ppt/slideLayouts/slideLayout10.xml><?xml version="1.0" encoding="utf-8"?>
-<p:sldLayout xmlns:a="http://schemas.openxmlformats.org/drawingml/2006/main" xmlns:p="http://schemas.openxmlformats.org/presentationml/2006/main">
+<p:sldLayout xmlns:a="http://schemas.openxmlformats.org/drawingml/2006/main" xmlns:r="http://schemas.openxmlformats.org/officeDocument/2006/relationships" xmlns:p="http://schemas.openxmlformats.org/presentationml/2006/main">
   <p:cSld name="标题和竖排文字">
     <p:spTree>
       <p:nvGrpSpPr>
-        <p:cNvPr id="64" name=""/>
+        <p:cNvPr id="1" name=""/>
         <p:cNvGrpSpPr/>
         <p:nvPr/>
       </p:nvGrpSpPr>
@@ -338,7 +336,7 @@
         <p:nvSpPr>
           <p:cNvPr id="65" name="标题 1"/>
           <p:cNvSpPr>
-            <a:spLocks noGrp="true"/>
+            <a:spLocks noGrp="1"/>
           </p:cNvSpPr>
           <p:nvPr>
             <p:ph type="title"/>
@@ -347,8 +345,8 @@
         <p:spPr/>
         <p:txBody>
           <a:bodyPr/>
-          <a:p>
-            <a:pPr/>
+          <a:lstStyle/>
+          <a:p>
             <a:r>
               <a:rPr lang="zh-CN"/>
               <a:t>单击此处编辑母版标题样式</a:t>
@@ -361,7 +359,7 @@
         <p:nvSpPr>
           <p:cNvPr id="66" name="竖排文字占位符 2"/>
           <p:cNvSpPr>
-            <a:spLocks noGrp="true"/>
+            <a:spLocks noGrp="1"/>
           </p:cNvSpPr>
           <p:nvPr>
             <p:ph type="body" idx="1"/>
@@ -370,6 +368,7 @@
         <p:spPr/>
         <p:txBody>
           <a:bodyPr vert="eaVert"/>
+          <a:lstStyle/>
           <a:p>
             <a:pPr lvl="0"/>
             <a:r>
@@ -416,7 +415,7 @@
         <p:nvSpPr>
           <p:cNvPr id="67" name="日期占位符 3"/>
           <p:cNvSpPr>
-            <a:spLocks noGrp="true"/>
+            <a:spLocks noGrp="1"/>
           </p:cNvSpPr>
           <p:nvPr>
             <p:ph type="dt" idx="10"/>
@@ -425,11 +424,11 @@
         <p:spPr/>
         <p:txBody>
           <a:bodyPr/>
-          <a:p>
-            <a:pPr/>
+          <a:lstStyle/>
+          <a:p>
             <a:fld id="{9772B07E-4E44-4E95-89AF-F1EF6F4CC7EC}" type="datetime1">
-              <a:rPr lang="zh-CN"/>
-              <a:t>2022/12/22</a:t>
+              <a:rPr lang="en-US" altLang="zh-CN"/>
+              <a:t>2025/12/16</a:t>
             </a:fld>
             <a:endParaRPr lang="zh-CN"/>
           </a:p>
@@ -439,7 +438,7 @@
         <p:nvSpPr>
           <p:cNvPr id="68" name="页脚占位符 4"/>
           <p:cNvSpPr>
-            <a:spLocks noGrp="true"/>
+            <a:spLocks noGrp="1"/>
           </p:cNvSpPr>
           <p:nvPr>
             <p:ph type="ftr" idx="11"/>
@@ -448,8 +447,8 @@
         <p:spPr/>
         <p:txBody>
           <a:bodyPr/>
-          <a:p>
-            <a:pPr/>
+          <a:lstStyle/>
+          <a:p>
             <a:endParaRPr lang="zh-CN"/>
           </a:p>
         </p:txBody>
@@ -458,7 +457,7 @@
         <p:nvSpPr>
           <p:cNvPr id="69" name="灯片编号占位符 5"/>
           <p:cNvSpPr>
-            <a:spLocks noGrp="true"/>
+            <a:spLocks noGrp="1"/>
           </p:cNvSpPr>
           <p:nvPr>
             <p:ph type="sldNum" idx="12"/>
@@ -467,8 +466,8 @@
         <p:spPr/>
         <p:txBody>
           <a:bodyPr/>
-          <a:p>
-            <a:pPr/>
+          <a:lstStyle/>
+          <a:p>
             <a:fld id="{10D47AF7-089F-4725-8B45-DEA8A59F6C62}" type="slidenum">
               <a:rPr lang="zh-CN"/>
               <a:t>‹#›</a:t>
@@ -486,11 +485,11 @@
 </file>
 
 <file path=ppt/slideLayouts/slideLayout11.xml><?xml version="1.0" encoding="utf-8"?>
-<p:sldLayout xmlns:a="http://schemas.openxmlformats.org/drawingml/2006/main" xmlns:p="http://schemas.openxmlformats.org/presentationml/2006/main">
+<p:sldLayout xmlns:a="http://schemas.openxmlformats.org/drawingml/2006/main" xmlns:r="http://schemas.openxmlformats.org/officeDocument/2006/relationships" xmlns:p="http://schemas.openxmlformats.org/presentationml/2006/main">
   <p:cSld name="竖排标题与文本">
     <p:spTree>
       <p:nvGrpSpPr>
-        <p:cNvPr id="13" name=""/>
+        <p:cNvPr id="1" name=""/>
         <p:cNvGrpSpPr/>
         <p:nvPr/>
       </p:nvGrpSpPr>
@@ -506,7 +505,7 @@
         <p:nvSpPr>
           <p:cNvPr id="14" name="竖排标题 1"/>
           <p:cNvSpPr>
-            <a:spLocks noGrp="true"/>
+            <a:spLocks noGrp="1"/>
           </p:cNvSpPr>
           <p:nvPr>
             <p:ph type="title"/>
@@ -520,8 +519,8 @@
         </p:spPr>
         <p:txBody>
           <a:bodyPr vert="eaVert"/>
-          <a:p>
-            <a:pPr/>
+          <a:lstStyle/>
+          <a:p>
             <a:r>
               <a:rPr lang="zh-CN"/>
               <a:t>单击此处编辑母版标题样式</a:t>
@@ -534,7 +533,7 @@
         <p:nvSpPr>
           <p:cNvPr id="15" name="竖排文字占位符 2"/>
           <p:cNvSpPr>
-            <a:spLocks noGrp="true"/>
+            <a:spLocks noGrp="1"/>
           </p:cNvSpPr>
           <p:nvPr>
             <p:ph type="body" idx="1"/>
@@ -548,6 +547,7 @@
         </p:spPr>
         <p:txBody>
           <a:bodyPr vert="eaVert"/>
+          <a:lstStyle/>
           <a:p>
             <a:pPr lvl="0"/>
             <a:r>
@@ -594,7 +594,7 @@
         <p:nvSpPr>
           <p:cNvPr id="16" name="日期占位符 3"/>
           <p:cNvSpPr>
-            <a:spLocks noGrp="true"/>
+            <a:spLocks noGrp="1"/>
           </p:cNvSpPr>
           <p:nvPr>
             <p:ph type="dt" idx="10"/>
@@ -603,11 +603,11 @@
         <p:spPr/>
         <p:txBody>
           <a:bodyPr/>
-          <a:p>
-            <a:pPr/>
+          <a:lstStyle/>
+          <a:p>
             <a:fld id="{17AA1729-FFEC-4670-BE57-9BB1B6CF1583}" type="datetime1">
-              <a:rPr lang="zh-CN"/>
-              <a:t>2022/12/22</a:t>
+              <a:rPr lang="en-US" altLang="zh-CN"/>
+              <a:t>2025/12/16</a:t>
             </a:fld>
             <a:endParaRPr lang="zh-CN"/>
           </a:p>
@@ -617,7 +617,7 @@
         <p:nvSpPr>
           <p:cNvPr id="17" name="页脚占位符 4"/>
           <p:cNvSpPr>
-            <a:spLocks noGrp="true"/>
+            <a:spLocks noGrp="1"/>
           </p:cNvSpPr>
           <p:nvPr>
             <p:ph type="ftr" idx="11"/>
@@ -626,8 +626,8 @@
         <p:spPr/>
         <p:txBody>
           <a:bodyPr/>
-          <a:p>
-            <a:pPr/>
+          <a:lstStyle/>
+          <a:p>
             <a:endParaRPr lang="zh-CN"/>
           </a:p>
         </p:txBody>
@@ -636,7 +636,7 @@
         <p:nvSpPr>
           <p:cNvPr id="18" name="灯片编号占位符 5"/>
           <p:cNvSpPr>
-            <a:spLocks noGrp="true"/>
+            <a:spLocks noGrp="1"/>
           </p:cNvSpPr>
           <p:nvPr>
             <p:ph type="sldNum" idx="12"/>
@@ -645,8 +645,8 @@
         <p:spPr/>
         <p:txBody>
           <a:bodyPr/>
-          <a:p>
-            <a:pPr/>
+          <a:lstStyle/>
+          <a:p>
             <a:fld id="{A7AACFD0-6D64-47CD-A483-D6FD45307366}" type="slidenum">
               <a:rPr lang="zh-CN"/>
               <a:t>‹#›</a:t>
@@ -664,11 +664,11 @@
 </file>
 
 <file path=ppt/slideLayouts/slideLayout2.xml><?xml version="1.0" encoding="utf-8"?>
-<p:sldLayout xmlns:a="http://schemas.openxmlformats.org/drawingml/2006/main" xmlns:p="http://schemas.openxmlformats.org/presentationml/2006/main">
+<p:sldLayout xmlns:a="http://schemas.openxmlformats.org/drawingml/2006/main" xmlns:r="http://schemas.openxmlformats.org/officeDocument/2006/relationships" xmlns:p="http://schemas.openxmlformats.org/presentationml/2006/main">
   <p:cSld name="标题和内容">
     <p:spTree>
       <p:nvGrpSpPr>
-        <p:cNvPr id="7" name=""/>
+        <p:cNvPr id="1" name=""/>
         <p:cNvGrpSpPr/>
         <p:nvPr/>
       </p:nvGrpSpPr>
@@ -684,7 +684,7 @@
         <p:nvSpPr>
           <p:cNvPr id="8" name="标题 1"/>
           <p:cNvSpPr>
-            <a:spLocks noGrp="true"/>
+            <a:spLocks noGrp="1"/>
           </p:cNvSpPr>
           <p:nvPr>
             <p:ph type="title"/>
@@ -693,8 +693,8 @@
         <p:spPr/>
         <p:txBody>
           <a:bodyPr/>
-          <a:p>
-            <a:pPr/>
+          <a:lstStyle/>
+          <a:p>
             <a:r>
               <a:rPr lang="zh-CN"/>
               <a:t>单击此处编辑母版标题样式</a:t>
@@ -707,7 +707,7 @@
         <p:nvSpPr>
           <p:cNvPr id="9" name="内容占位符 2"/>
           <p:cNvSpPr>
-            <a:spLocks noGrp="true"/>
+            <a:spLocks noGrp="1"/>
           </p:cNvSpPr>
           <p:nvPr>
             <p:ph idx="1"/>
@@ -716,6 +716,7 @@
         <p:spPr/>
         <p:txBody>
           <a:bodyPr/>
+          <a:lstStyle/>
           <a:p>
             <a:pPr lvl="0"/>
             <a:r>
@@ -762,7 +763,7 @@
         <p:nvSpPr>
           <p:cNvPr id="10" name="日期占位符 3"/>
           <p:cNvSpPr>
-            <a:spLocks noGrp="true"/>
+            <a:spLocks noGrp="1"/>
           </p:cNvSpPr>
           <p:nvPr>
             <p:ph type="dt" idx="10"/>
@@ -771,11 +772,11 @@
         <p:spPr/>
         <p:txBody>
           <a:bodyPr/>
-          <a:p>
-            <a:pPr/>
+          <a:lstStyle/>
+          <a:p>
             <a:fld id="{7B03108F-6D01-401F-BB83-A4EE273EE035}" type="datetime1">
-              <a:rPr lang="zh-CN"/>
-              <a:t>2022/12/22</a:t>
+              <a:rPr lang="en-US" altLang="zh-CN"/>
+              <a:t>2025/12/16</a:t>
             </a:fld>
             <a:endParaRPr lang="zh-CN"/>
           </a:p>
@@ -785,7 +786,7 @@
         <p:nvSpPr>
           <p:cNvPr id="11" name="页脚占位符 4"/>
           <p:cNvSpPr>
-            <a:spLocks noGrp="true"/>
+            <a:spLocks noGrp="1"/>
           </p:cNvSpPr>
           <p:nvPr>
             <p:ph type="ftr" idx="11"/>
@@ -794,8 +795,8 @@
         <p:spPr/>
         <p:txBody>
           <a:bodyPr/>
-          <a:p>
-            <a:pPr/>
+          <a:lstStyle/>
+          <a:p>
             <a:endParaRPr lang="zh-CN"/>
           </a:p>
         </p:txBody>
@@ -804,7 +805,7 @@
         <p:nvSpPr>
           <p:cNvPr id="12" name="灯片编号占位符 5"/>
           <p:cNvSpPr>
-            <a:spLocks noGrp="true"/>
+            <a:spLocks noGrp="1"/>
           </p:cNvSpPr>
           <p:nvPr>
             <p:ph type="sldNum" idx="12"/>
@@ -813,8 +814,8 @@
         <p:spPr/>
         <p:txBody>
           <a:bodyPr/>
-          <a:p>
-            <a:pPr/>
+          <a:lstStyle/>
+          <a:p>
             <a:fld id="{2A18DFAB-279D-45FB-8988-01B47F34F95A}" type="slidenum">
               <a:rPr lang="zh-CN"/>
               <a:t>‹#›</a:t>
@@ -832,11 +833,11 @@
 </file>
 
 <file path=ppt/slideLayouts/slideLayout3.xml><?xml version="1.0" encoding="utf-8"?>
-<p:sldLayout xmlns:a="http://schemas.openxmlformats.org/drawingml/2006/main" xmlns:p="http://schemas.openxmlformats.org/presentationml/2006/main">
+<p:sldLayout xmlns:a="http://schemas.openxmlformats.org/drawingml/2006/main" xmlns:r="http://schemas.openxmlformats.org/officeDocument/2006/relationships" xmlns:p="http://schemas.openxmlformats.org/presentationml/2006/main">
   <p:cSld name="节标题">
     <p:spTree>
       <p:nvGrpSpPr>
-        <p:cNvPr id="19" name=""/>
+        <p:cNvPr id="1" name=""/>
         <p:cNvGrpSpPr/>
         <p:nvPr/>
       </p:nvGrpSpPr>
@@ -852,7 +853,7 @@
         <p:nvSpPr>
           <p:cNvPr id="20" name="标题 1"/>
           <p:cNvSpPr>
-            <a:spLocks noGrp="true"/>
+            <a:spLocks noGrp="1"/>
           </p:cNvSpPr>
           <p:nvPr>
             <p:ph type="title"/>
@@ -872,7 +873,6 @@
             </a:lvl1pPr>
           </a:lstStyle>
           <a:p>
-            <a:pPr/>
             <a:r>
               <a:rPr lang="zh-CN"/>
               <a:t>单击此处编辑母版标题样式</a:t>
@@ -885,7 +885,7 @@
         <p:nvSpPr>
           <p:cNvPr id="21" name="文本占位符 2"/>
           <p:cNvSpPr>
-            <a:spLocks noGrp="true"/>
+            <a:spLocks noGrp="1"/>
           </p:cNvSpPr>
           <p:nvPr>
             <p:ph type="body" idx="1"/>
@@ -1005,7 +1005,7 @@
         <p:nvSpPr>
           <p:cNvPr id="22" name="日期占位符 3"/>
           <p:cNvSpPr>
-            <a:spLocks noGrp="true"/>
+            <a:spLocks noGrp="1"/>
           </p:cNvSpPr>
           <p:nvPr>
             <p:ph type="dt" idx="10"/>
@@ -1014,11 +1014,11 @@
         <p:spPr/>
         <p:txBody>
           <a:bodyPr/>
-          <a:p>
-            <a:pPr/>
+          <a:lstStyle/>
+          <a:p>
             <a:fld id="{8D5B006A-3E28-4231-AF04-14767498E664}" type="datetime1">
-              <a:rPr lang="zh-CN"/>
-              <a:t>2022/12/22</a:t>
+              <a:rPr lang="en-US" altLang="zh-CN"/>
+              <a:t>2025/12/16</a:t>
             </a:fld>
             <a:endParaRPr lang="zh-CN"/>
           </a:p>
@@ -1028,7 +1028,7 @@
         <p:nvSpPr>
           <p:cNvPr id="23" name="页脚占位符 4"/>
           <p:cNvSpPr>
-            <a:spLocks noGrp="true"/>
+            <a:spLocks noGrp="1"/>
           </p:cNvSpPr>
           <p:nvPr>
             <p:ph type="ftr" idx="11"/>
@@ -1037,8 +1037,8 @@
         <p:spPr/>
         <p:txBody>
           <a:bodyPr/>
-          <a:p>
-            <a:pPr/>
+          <a:lstStyle/>
+          <a:p>
             <a:endParaRPr lang="zh-CN"/>
           </a:p>
         </p:txBody>
@@ -1047,7 +1047,7 @@
         <p:nvSpPr>
           <p:cNvPr id="24" name="灯片编号占位符 5"/>
           <p:cNvSpPr>
-            <a:spLocks noGrp="true"/>
+            <a:spLocks noGrp="1"/>
           </p:cNvSpPr>
           <p:nvPr>
             <p:ph type="sldNum" idx="12"/>
@@ -1056,8 +1056,8 @@
         <p:spPr/>
         <p:txBody>
           <a:bodyPr/>
-          <a:p>
-            <a:pPr/>
+          <a:lstStyle/>
+          <a:p>
             <a:fld id="{C8B94FA0-F740-4CDC-A935-5AEA919A98DA}" type="slidenum">
               <a:rPr lang="zh-CN"/>
               <a:t>‹#›</a:t>
@@ -1075,11 +1075,11 @@
 </file>
 
 <file path=ppt/slideLayouts/slideLayout4.xml><?xml version="1.0" encoding="utf-8"?>
-<p:sldLayout xmlns:a="http://schemas.openxmlformats.org/drawingml/2006/main" xmlns:p="http://schemas.openxmlformats.org/presentationml/2006/main">
+<p:sldLayout xmlns:a="http://schemas.openxmlformats.org/drawingml/2006/main" xmlns:r="http://schemas.openxmlformats.org/officeDocument/2006/relationships" xmlns:p="http://schemas.openxmlformats.org/presentationml/2006/main">
   <p:cSld name="两栏内容">
     <p:spTree>
       <p:nvGrpSpPr>
-        <p:cNvPr id="25" name=""/>
+        <p:cNvPr id="1" name=""/>
         <p:cNvGrpSpPr/>
         <p:nvPr/>
       </p:nvGrpSpPr>
@@ -1095,7 +1095,7 @@
         <p:nvSpPr>
           <p:cNvPr id="26" name="标题 1"/>
           <p:cNvSpPr>
-            <a:spLocks noGrp="true"/>
+            <a:spLocks noGrp="1"/>
           </p:cNvSpPr>
           <p:nvPr>
             <p:ph type="title"/>
@@ -1104,8 +1104,8 @@
         <p:spPr/>
         <p:txBody>
           <a:bodyPr/>
-          <a:p>
-            <a:pPr/>
+          <a:lstStyle/>
+          <a:p>
             <a:r>
               <a:rPr lang="zh-CN"/>
               <a:t>单击此处编辑母版标题样式</a:t>
@@ -1118,7 +1118,7 @@
         <p:nvSpPr>
           <p:cNvPr id="27" name="内容占位符 2"/>
           <p:cNvSpPr>
-            <a:spLocks noGrp="true"/>
+            <a:spLocks noGrp="1"/>
           </p:cNvSpPr>
           <p:nvPr>
             <p:ph idx="1"/>
@@ -1132,6 +1132,7 @@
         </p:spPr>
         <p:txBody>
           <a:bodyPr/>
+          <a:lstStyle/>
           <a:p>
             <a:pPr lvl="0"/>
             <a:r>
@@ -1178,7 +1179,7 @@
         <p:nvSpPr>
           <p:cNvPr id="28" name="内容占位符 3"/>
           <p:cNvSpPr>
-            <a:spLocks noGrp="true"/>
+            <a:spLocks noGrp="1"/>
           </p:cNvSpPr>
           <p:nvPr>
             <p:ph idx="2"/>
@@ -1192,6 +1193,7 @@
         </p:spPr>
         <p:txBody>
           <a:bodyPr/>
+          <a:lstStyle/>
           <a:p>
             <a:pPr lvl="0"/>
             <a:r>
@@ -1238,7 +1240,7 @@
         <p:nvSpPr>
           <p:cNvPr id="29" name="日期占位符 4"/>
           <p:cNvSpPr>
-            <a:spLocks noGrp="true"/>
+            <a:spLocks noGrp="1"/>
           </p:cNvSpPr>
           <p:nvPr>
             <p:ph type="dt" idx="10"/>
@@ -1247,11 +1249,11 @@
         <p:spPr/>
         <p:txBody>
           <a:bodyPr/>
-          <a:p>
-            <a:pPr/>
+          <a:lstStyle/>
+          <a:p>
             <a:fld id="{A1F3BCCF-927F-4C14-9052-F5177C3C439D}" type="datetime1">
-              <a:rPr lang="zh-CN"/>
-              <a:t>2022/12/22</a:t>
+              <a:rPr lang="en-US" altLang="zh-CN"/>
+              <a:t>2025/12/16</a:t>
             </a:fld>
             <a:endParaRPr lang="zh-CN"/>
           </a:p>
@@ -1261,7 +1263,7 @@
         <p:nvSpPr>
           <p:cNvPr id="30" name="页脚占位符 5"/>
           <p:cNvSpPr>
-            <a:spLocks noGrp="true"/>
+            <a:spLocks noGrp="1"/>
           </p:cNvSpPr>
           <p:nvPr>
             <p:ph type="ftr" idx="11"/>
@@ -1270,8 +1272,8 @@
         <p:spPr/>
         <p:txBody>
           <a:bodyPr/>
-          <a:p>
-            <a:pPr/>
+          <a:lstStyle/>
+          <a:p>
             <a:endParaRPr lang="zh-CN"/>
           </a:p>
         </p:txBody>
@@ -1280,7 +1282,7 @@
         <p:nvSpPr>
           <p:cNvPr id="31" name="灯片编号占位符 6"/>
           <p:cNvSpPr>
-            <a:spLocks noGrp="true"/>
+            <a:spLocks noGrp="1"/>
           </p:cNvSpPr>
           <p:nvPr>
             <p:ph type="sldNum" idx="12"/>
@@ -1289,8 +1291,8 @@
         <p:spPr/>
         <p:txBody>
           <a:bodyPr/>
-          <a:p>
-            <a:pPr/>
+          <a:lstStyle/>
+          <a:p>
             <a:fld id="{408259AF-2A25-452C-AA5F-7B080E8C5A7E}" type="slidenum">
               <a:rPr lang="zh-CN"/>
               <a:t>‹#›</a:t>
@@ -1308,11 +1310,11 @@
 </file>
 
 <file path=ppt/slideLayouts/slideLayout5.xml><?xml version="1.0" encoding="utf-8"?>
-<p:sldLayout xmlns:a="http://schemas.openxmlformats.org/drawingml/2006/main" xmlns:p="http://schemas.openxmlformats.org/presentationml/2006/main">
+<p:sldLayout xmlns:a="http://schemas.openxmlformats.org/drawingml/2006/main" xmlns:r="http://schemas.openxmlformats.org/officeDocument/2006/relationships" xmlns:p="http://schemas.openxmlformats.org/presentationml/2006/main">
   <p:cSld name="比较">
     <p:spTree>
       <p:nvGrpSpPr>
-        <p:cNvPr id="32" name=""/>
+        <p:cNvPr id="1" name=""/>
         <p:cNvGrpSpPr/>
         <p:nvPr/>
       </p:nvGrpSpPr>
@@ -1328,7 +1330,7 @@
         <p:nvSpPr>
           <p:cNvPr id="33" name="标题 1"/>
           <p:cNvSpPr>
-            <a:spLocks noGrp="true"/>
+            <a:spLocks noGrp="1"/>
           </p:cNvSpPr>
           <p:nvPr>
             <p:ph type="title"/>
@@ -1342,8 +1344,8 @@
         </p:spPr>
         <p:txBody>
           <a:bodyPr/>
-          <a:p>
-            <a:pPr/>
+          <a:lstStyle/>
+          <a:p>
             <a:r>
               <a:rPr lang="zh-CN"/>
               <a:t>单击此处编辑母版标题样式</a:t>
@@ -1356,7 +1358,7 @@
         <p:nvSpPr>
           <p:cNvPr id="34" name="文本占位符 2"/>
           <p:cNvSpPr>
-            <a:spLocks noGrp="true"/>
+            <a:spLocks noGrp="1"/>
           </p:cNvSpPr>
           <p:nvPr>
             <p:ph type="body" idx="1"/>
@@ -1373,39 +1375,39 @@
           <a:lstStyle>
             <a:lvl1pPr marL="0" lvl="0" indent="0">
               <a:buNone/>
-              <a:defRPr sz="2400" b="true"/>
+              <a:defRPr sz="2400" b="1"/>
             </a:lvl1pPr>
             <a:lvl2pPr marL="457200" lvl="1" indent="0">
               <a:buNone/>
-              <a:defRPr sz="2000" b="true"/>
+              <a:defRPr sz="2000" b="1"/>
             </a:lvl2pPr>
             <a:lvl3pPr marL="914400" lvl="2" indent="0">
               <a:buNone/>
-              <a:defRPr sz="1800" b="true"/>
+              <a:defRPr sz="1800" b="1"/>
             </a:lvl3pPr>
             <a:lvl4pPr marL="1371600" lvl="3" indent="0">
               <a:buNone/>
-              <a:defRPr sz="1600" b="true"/>
+              <a:defRPr sz="1600" b="1"/>
             </a:lvl4pPr>
             <a:lvl5pPr marL="1828800" lvl="4" indent="0">
               <a:buNone/>
-              <a:defRPr sz="1600" b="true"/>
+              <a:defRPr sz="1600" b="1"/>
             </a:lvl5pPr>
             <a:lvl6pPr marL="2286000" lvl="5" indent="0">
               <a:buNone/>
-              <a:defRPr sz="1600" b="true"/>
+              <a:defRPr sz="1600" b="1"/>
             </a:lvl6pPr>
             <a:lvl7pPr marL="2743200" lvl="6" indent="0">
               <a:buNone/>
-              <a:defRPr sz="1600" b="true"/>
+              <a:defRPr sz="1600" b="1"/>
             </a:lvl7pPr>
             <a:lvl8pPr marL="3200400" lvl="7" indent="0">
               <a:buNone/>
-              <a:defRPr sz="1600" b="true"/>
+              <a:defRPr sz="1600" b="1"/>
             </a:lvl8pPr>
             <a:lvl9pPr marL="3657600" lvl="8" indent="0">
               <a:buNone/>
-              <a:defRPr sz="1600" b="true"/>
+              <a:defRPr sz="1600" b="1"/>
             </a:lvl9pPr>
           </a:lstStyle>
           <a:p>
@@ -1422,7 +1424,7 @@
         <p:nvSpPr>
           <p:cNvPr id="35" name="内容占位符 3"/>
           <p:cNvSpPr>
-            <a:spLocks noGrp="true"/>
+            <a:spLocks noGrp="1"/>
           </p:cNvSpPr>
           <p:nvPr>
             <p:ph idx="2"/>
@@ -1436,6 +1438,7 @@
         </p:spPr>
         <p:txBody>
           <a:bodyPr/>
+          <a:lstStyle/>
           <a:p>
             <a:pPr lvl="0"/>
             <a:r>
@@ -1482,7 +1485,7 @@
         <p:nvSpPr>
           <p:cNvPr id="36" name="文本占位符 4"/>
           <p:cNvSpPr>
-            <a:spLocks noGrp="true"/>
+            <a:spLocks noGrp="1"/>
           </p:cNvSpPr>
           <p:nvPr>
             <p:ph type="body" idx="3"/>
@@ -1499,39 +1502,39 @@
           <a:lstStyle>
             <a:lvl1pPr marL="0" lvl="0" indent="0">
               <a:buNone/>
-              <a:defRPr sz="2400" b="true"/>
+              <a:defRPr sz="2400" b="1"/>
             </a:lvl1pPr>
             <a:lvl2pPr marL="457200" lvl="1" indent="0">
               <a:buNone/>
-              <a:defRPr sz="2000" b="true"/>
+              <a:defRPr sz="2000" b="1"/>
             </a:lvl2pPr>
             <a:lvl3pPr marL="914400" lvl="2" indent="0">
               <a:buNone/>
-              <a:defRPr sz="1800" b="true"/>
+              <a:defRPr sz="1800" b="1"/>
             </a:lvl3pPr>
             <a:lvl4pPr marL="1371600" lvl="3" indent="0">
               <a:buNone/>
-              <a:defRPr sz="1600" b="true"/>
+              <a:defRPr sz="1600" b="1"/>
             </a:lvl4pPr>
             <a:lvl5pPr marL="1828800" lvl="4" indent="0">
               <a:buNone/>
-              <a:defRPr sz="1600" b="true"/>
+              <a:defRPr sz="1600" b="1"/>
             </a:lvl5pPr>
             <a:lvl6pPr marL="2286000" lvl="5" indent="0">
               <a:buNone/>
-              <a:defRPr sz="1600" b="true"/>
+              <a:defRPr sz="1600" b="1"/>
             </a:lvl6pPr>
             <a:lvl7pPr marL="2743200" lvl="6" indent="0">
               <a:buNone/>
-              <a:defRPr sz="1600" b="true"/>
+              <a:defRPr sz="1600" b="1"/>
             </a:lvl7pPr>
             <a:lvl8pPr marL="3200400" lvl="7" indent="0">
               <a:buNone/>
-              <a:defRPr sz="1600" b="true"/>
+              <a:defRPr sz="1600" b="1"/>
             </a:lvl8pPr>
             <a:lvl9pPr marL="3657600" lvl="8" indent="0">
               <a:buNone/>
-              <a:defRPr sz="1600" b="true"/>
+              <a:defRPr sz="1600" b="1"/>
             </a:lvl9pPr>
           </a:lstStyle>
           <a:p>
@@ -1548,7 +1551,7 @@
         <p:nvSpPr>
           <p:cNvPr id="37" name="内容占位符 5"/>
           <p:cNvSpPr>
-            <a:spLocks noGrp="true"/>
+            <a:spLocks noGrp="1"/>
           </p:cNvSpPr>
           <p:nvPr>
             <p:ph idx="4"/>
@@ -1562,6 +1565,7 @@
         </p:spPr>
         <p:txBody>
           <a:bodyPr/>
+          <a:lstStyle/>
           <a:p>
             <a:pPr lvl="0"/>
             <a:r>
@@ -1608,7 +1612,7 @@
         <p:nvSpPr>
           <p:cNvPr id="38" name="日期占位符 6"/>
           <p:cNvSpPr>
-            <a:spLocks noGrp="true"/>
+            <a:spLocks noGrp="1"/>
           </p:cNvSpPr>
           <p:nvPr>
             <p:ph type="dt" idx="10"/>
@@ -1617,11 +1621,11 @@
         <p:spPr/>
         <p:txBody>
           <a:bodyPr/>
-          <a:p>
-            <a:pPr/>
+          <a:lstStyle/>
+          <a:p>
             <a:fld id="{E19FF268-CF0C-4595-A6A8-A0B1FC2FEB42}" type="datetime1">
-              <a:rPr lang="zh-CN"/>
-              <a:t>2022/12/22</a:t>
+              <a:rPr lang="en-US" altLang="zh-CN"/>
+              <a:t>2025/12/16</a:t>
             </a:fld>
             <a:endParaRPr lang="zh-CN"/>
           </a:p>
@@ -1631,7 +1635,7 @@
         <p:nvSpPr>
           <p:cNvPr id="39" name="页脚占位符 7"/>
           <p:cNvSpPr>
-            <a:spLocks noGrp="true"/>
+            <a:spLocks noGrp="1"/>
           </p:cNvSpPr>
           <p:nvPr>
             <p:ph type="ftr" idx="11"/>
@@ -1640,8 +1644,8 @@
         <p:spPr/>
         <p:txBody>
           <a:bodyPr/>
-          <a:p>
-            <a:pPr/>
+          <a:lstStyle/>
+          <a:p>
             <a:endParaRPr lang="zh-CN"/>
           </a:p>
         </p:txBody>
@@ -1650,7 +1654,7 @@
         <p:nvSpPr>
           <p:cNvPr id="40" name="灯片编号占位符 8"/>
           <p:cNvSpPr>
-            <a:spLocks noGrp="true"/>
+            <a:spLocks noGrp="1"/>
           </p:cNvSpPr>
           <p:nvPr>
             <p:ph type="sldNum" idx="12"/>
@@ -1659,8 +1663,8 @@
         <p:spPr/>
         <p:txBody>
           <a:bodyPr/>
-          <a:p>
-            <a:pPr/>
+          <a:lstStyle/>
+          <a:p>
             <a:fld id="{63A90A56-B7DA-460C-8F46-95BFAF0AF95F}" type="slidenum">
               <a:rPr lang="zh-CN"/>
               <a:t>‹#›</a:t>
@@ -1678,11 +1682,11 @@
 </file>
 
 <file path=ppt/slideLayouts/slideLayout6.xml><?xml version="1.0" encoding="utf-8"?>
-<p:sldLayout xmlns:a="http://schemas.openxmlformats.org/drawingml/2006/main" xmlns:p="http://schemas.openxmlformats.org/presentationml/2006/main">
+<p:sldLayout xmlns:a="http://schemas.openxmlformats.org/drawingml/2006/main" xmlns:r="http://schemas.openxmlformats.org/officeDocument/2006/relationships" xmlns:p="http://schemas.openxmlformats.org/presentationml/2006/main">
   <p:cSld name="仅标题">
     <p:spTree>
       <p:nvGrpSpPr>
-        <p:cNvPr id="41" name=""/>
+        <p:cNvPr id="1" name=""/>
         <p:cNvGrpSpPr/>
         <p:nvPr/>
       </p:nvGrpSpPr>
@@ -1698,7 +1702,7 @@
         <p:nvSpPr>
           <p:cNvPr id="42" name="标题 1"/>
           <p:cNvSpPr>
-            <a:spLocks noGrp="true"/>
+            <a:spLocks noGrp="1"/>
           </p:cNvSpPr>
           <p:nvPr>
             <p:ph type="title"/>
@@ -1707,8 +1711,8 @@
         <p:spPr/>
         <p:txBody>
           <a:bodyPr/>
-          <a:p>
-            <a:pPr/>
+          <a:lstStyle/>
+          <a:p>
             <a:r>
               <a:rPr lang="zh-CN"/>
               <a:t>单击此处编辑母版标题样式</a:t>
@@ -1721,7 +1725,7 @@
         <p:nvSpPr>
           <p:cNvPr id="43" name="日期占位符 2"/>
           <p:cNvSpPr>
-            <a:spLocks noGrp="true"/>
+            <a:spLocks noGrp="1"/>
           </p:cNvSpPr>
           <p:nvPr>
             <p:ph type="dt" idx="10"/>
@@ -1730,11 +1734,11 @@
         <p:spPr/>
         <p:txBody>
           <a:bodyPr/>
-          <a:p>
-            <a:pPr/>
+          <a:lstStyle/>
+          <a:p>
             <a:fld id="{E05E0E50-3259-4429-AAEB-7BA10F2285FC}" type="datetime1">
-              <a:rPr lang="zh-CN"/>
-              <a:t>2022/12/22</a:t>
+              <a:rPr lang="en-US" altLang="zh-CN"/>
+              <a:t>2025/12/16</a:t>
             </a:fld>
             <a:endParaRPr lang="zh-CN"/>
           </a:p>
@@ -1744,7 +1748,7 @@
         <p:nvSpPr>
           <p:cNvPr id="44" name="页脚占位符 3"/>
           <p:cNvSpPr>
-            <a:spLocks noGrp="true"/>
+            <a:spLocks noGrp="1"/>
           </p:cNvSpPr>
           <p:nvPr>
             <p:ph type="ftr" idx="11"/>
@@ -1753,8 +1757,8 @@
         <p:spPr/>
         <p:txBody>
           <a:bodyPr/>
-          <a:p>
-            <a:pPr/>
+          <a:lstStyle/>
+          <a:p>
             <a:endParaRPr lang="zh-CN"/>
           </a:p>
         </p:txBody>
@@ -1763,7 +1767,7 @@
         <p:nvSpPr>
           <p:cNvPr id="45" name="灯片编号占位符 4"/>
           <p:cNvSpPr>
-            <a:spLocks noGrp="true"/>
+            <a:spLocks noGrp="1"/>
           </p:cNvSpPr>
           <p:nvPr>
             <p:ph type="sldNum" idx="12"/>
@@ -1772,8 +1776,8 @@
         <p:spPr/>
         <p:txBody>
           <a:bodyPr/>
-          <a:p>
-            <a:pPr/>
+          <a:lstStyle/>
+          <a:p>
             <a:fld id="{C2178EC5-58A4-4F44-B83C-34BE3E218ABE}" type="slidenum">
               <a:rPr lang="zh-CN"/>
               <a:t>‹#›</a:t>
@@ -1791,11 +1795,11 @@
 </file>
 
 <file path=ppt/slideLayouts/slideLayout7.xml><?xml version="1.0" encoding="utf-8"?>
-<p:sldLayout xmlns:a="http://schemas.openxmlformats.org/drawingml/2006/main" xmlns:p="http://schemas.openxmlformats.org/presentationml/2006/main">
+<p:sldLayout xmlns:a="http://schemas.openxmlformats.org/drawingml/2006/main" xmlns:r="http://schemas.openxmlformats.org/officeDocument/2006/relationships" xmlns:p="http://schemas.openxmlformats.org/presentationml/2006/main">
   <p:cSld name="空白">
     <p:spTree>
       <p:nvGrpSpPr>
-        <p:cNvPr id="46" name=""/>
+        <p:cNvPr id="1" name=""/>
         <p:cNvGrpSpPr/>
         <p:nvPr/>
       </p:nvGrpSpPr>
@@ -1811,7 +1815,7 @@
         <p:nvSpPr>
           <p:cNvPr id="47" name="日期占位符 1"/>
           <p:cNvSpPr>
-            <a:spLocks noGrp="true"/>
+            <a:spLocks noGrp="1"/>
           </p:cNvSpPr>
           <p:nvPr>
             <p:ph type="dt" idx="10"/>
@@ -1820,11 +1824,11 @@
         <p:spPr/>
         <p:txBody>
           <a:bodyPr/>
-          <a:p>
-            <a:pPr/>
+          <a:lstStyle/>
+          <a:p>
             <a:fld id="{03EF5456-EA9D-47AD-816E-BBFCE6D3FB5C}" type="datetime1">
-              <a:rPr lang="zh-CN"/>
-              <a:t>2022/12/22</a:t>
+              <a:rPr lang="en-US" altLang="zh-CN"/>
+              <a:t>2025/12/16</a:t>
             </a:fld>
             <a:endParaRPr lang="zh-CN"/>
           </a:p>
@@ -1834,7 +1838,7 @@
         <p:nvSpPr>
           <p:cNvPr id="48" name="页脚占位符 2"/>
           <p:cNvSpPr>
-            <a:spLocks noGrp="true"/>
+            <a:spLocks noGrp="1"/>
           </p:cNvSpPr>
           <p:nvPr>
             <p:ph type="ftr" idx="11"/>
@@ -1843,8 +1847,8 @@
         <p:spPr/>
         <p:txBody>
           <a:bodyPr/>
-          <a:p>
-            <a:pPr/>
+          <a:lstStyle/>
+          <a:p>
             <a:endParaRPr lang="zh-CN"/>
           </a:p>
         </p:txBody>
@@ -1853,7 +1857,7 @@
         <p:nvSpPr>
           <p:cNvPr id="49" name="灯片编号占位符 3"/>
           <p:cNvSpPr>
-            <a:spLocks noGrp="true"/>
+            <a:spLocks noGrp="1"/>
           </p:cNvSpPr>
           <p:nvPr>
             <p:ph type="sldNum" idx="12"/>
@@ -1862,8 +1866,8 @@
         <p:spPr/>
         <p:txBody>
           <a:bodyPr/>
-          <a:p>
-            <a:pPr/>
+          <a:lstStyle/>
+          <a:p>
             <a:fld id="{E3199BA4-F8C4-48F6-BF3D-6D4BD834E815}" type="slidenum">
               <a:rPr lang="zh-CN"/>
               <a:t>‹#›</a:t>
@@ -1881,11 +1885,11 @@
 </file>
 
 <file path=ppt/slideLayouts/slideLayout8.xml><?xml version="1.0" encoding="utf-8"?>
-<p:sldLayout xmlns:a="http://schemas.openxmlformats.org/drawingml/2006/main" xmlns:p="http://schemas.openxmlformats.org/presentationml/2006/main">
+<p:sldLayout xmlns:a="http://schemas.openxmlformats.org/drawingml/2006/main" xmlns:r="http://schemas.openxmlformats.org/officeDocument/2006/relationships" xmlns:p="http://schemas.openxmlformats.org/presentationml/2006/main">
   <p:cSld name="内容与标题">
     <p:spTree>
       <p:nvGrpSpPr>
-        <p:cNvPr id="50" name=""/>
+        <p:cNvPr id="1" name=""/>
         <p:cNvGrpSpPr/>
         <p:nvPr/>
       </p:nvGrpSpPr>
@@ -1901,7 +1905,7 @@
         <p:nvSpPr>
           <p:cNvPr id="51" name="标题 1"/>
           <p:cNvSpPr>
-            <a:spLocks noGrp="true"/>
+            <a:spLocks noGrp="1"/>
           </p:cNvSpPr>
           <p:nvPr>
             <p:ph type="title"/>
@@ -1921,7 +1925,6 @@
             </a:lvl1pPr>
           </a:lstStyle>
           <a:p>
-            <a:pPr/>
             <a:r>
               <a:rPr lang="zh-CN"/>
               <a:t>单击此处编辑母版标题样式</a:t>
@@ -1934,7 +1937,7 @@
         <p:nvSpPr>
           <p:cNvPr id="52" name="内容占位符 2"/>
           <p:cNvSpPr>
-            <a:spLocks noGrp="true"/>
+            <a:spLocks noGrp="1"/>
           </p:cNvSpPr>
           <p:nvPr>
             <p:ph idx="1"/>
@@ -2023,7 +2026,7 @@
         <p:nvSpPr>
           <p:cNvPr id="53" name="文本占位符 3"/>
           <p:cNvSpPr>
-            <a:spLocks noGrp="true"/>
+            <a:spLocks noGrp="1"/>
           </p:cNvSpPr>
           <p:nvPr>
             <p:ph type="body" idx="2"/>
@@ -2089,7 +2092,7 @@
         <p:nvSpPr>
           <p:cNvPr id="54" name="日期占位符 4"/>
           <p:cNvSpPr>
-            <a:spLocks noGrp="true"/>
+            <a:spLocks noGrp="1"/>
           </p:cNvSpPr>
           <p:nvPr>
             <p:ph type="dt" idx="10"/>
@@ -2098,11 +2101,11 @@
         <p:spPr/>
         <p:txBody>
           <a:bodyPr/>
-          <a:p>
-            <a:pPr/>
+          <a:lstStyle/>
+          <a:p>
             <a:fld id="{BDD0B665-21F2-4210-A0AB-1FF516ABB0EC}" type="datetime1">
-              <a:rPr lang="zh-CN"/>
-              <a:t>2022/12/22</a:t>
+              <a:rPr lang="en-US" altLang="zh-CN"/>
+              <a:t>2025/12/16</a:t>
             </a:fld>
             <a:endParaRPr lang="zh-CN"/>
           </a:p>
@@ -2112,7 +2115,7 @@
         <p:nvSpPr>
           <p:cNvPr id="55" name="页脚占位符 5"/>
           <p:cNvSpPr>
-            <a:spLocks noGrp="true"/>
+            <a:spLocks noGrp="1"/>
           </p:cNvSpPr>
           <p:nvPr>
             <p:ph type="ftr" idx="11"/>
@@ -2121,8 +2124,8 @@
         <p:spPr/>
         <p:txBody>
           <a:bodyPr/>
-          <a:p>
-            <a:pPr/>
+          <a:lstStyle/>
+          <a:p>
             <a:endParaRPr lang="zh-CN"/>
           </a:p>
         </p:txBody>
@@ -2131,7 +2134,7 @@
         <p:nvSpPr>
           <p:cNvPr id="56" name="灯片编号占位符 6"/>
           <p:cNvSpPr>
-            <a:spLocks noGrp="true"/>
+            <a:spLocks noGrp="1"/>
           </p:cNvSpPr>
           <p:nvPr>
             <p:ph type="sldNum" idx="12"/>
@@ -2140,8 +2143,8 @@
         <p:spPr/>
         <p:txBody>
           <a:bodyPr/>
-          <a:p>
-            <a:pPr/>
+          <a:lstStyle/>
+          <a:p>
             <a:fld id="{D3120986-D9F8-450A-8E8A-7B53A97B66E9}" type="slidenum">
               <a:rPr lang="zh-CN"/>
               <a:t>‹#›</a:t>
@@ -2159,11 +2162,11 @@
 </file>
 
 <file path=ppt/slideLayouts/slideLayout9.xml><?xml version="1.0" encoding="utf-8"?>
-<p:sldLayout xmlns:a="http://schemas.openxmlformats.org/drawingml/2006/main" xmlns:p="http://schemas.openxmlformats.org/presentationml/2006/main">
+<p:sldLayout xmlns:a="http://schemas.openxmlformats.org/drawingml/2006/main" xmlns:r="http://schemas.openxmlformats.org/officeDocument/2006/relationships" xmlns:p="http://schemas.openxmlformats.org/presentationml/2006/main">
   <p:cSld name="图片与标题">
     <p:spTree>
       <p:nvGrpSpPr>
-        <p:cNvPr id="57" name=""/>
+        <p:cNvPr id="1" name=""/>
         <p:cNvGrpSpPr/>
         <p:nvPr/>
       </p:nvGrpSpPr>
@@ -2179,7 +2182,7 @@
         <p:nvSpPr>
           <p:cNvPr id="58" name="标题 1"/>
           <p:cNvSpPr>
-            <a:spLocks noGrp="true"/>
+            <a:spLocks noGrp="1"/>
           </p:cNvSpPr>
           <p:nvPr>
             <p:ph type="title"/>
@@ -2199,7 +2202,6 @@
             </a:lvl1pPr>
           </a:lstStyle>
           <a:p>
-            <a:pPr/>
             <a:r>
               <a:rPr lang="zh-CN"/>
               <a:t>单击此处编辑母版标题样式</a:t>
@@ -2212,7 +2214,7 @@
         <p:nvSpPr>
           <p:cNvPr id="59" name="图片占位符 2"/>
           <p:cNvSpPr>
-            <a:spLocks noGrp="true"/>
+            <a:spLocks noGrp="1"/>
           </p:cNvSpPr>
           <p:nvPr>
             <p:ph type="pic" idx="1"/>
@@ -2265,7 +2267,6 @@
             </a:lvl9pPr>
           </a:lstStyle>
           <a:p>
-            <a:pPr/>
             <a:endParaRPr lang="zh-CN"/>
           </a:p>
         </p:txBody>
@@ -2274,7 +2275,7 @@
         <p:nvSpPr>
           <p:cNvPr id="60" name="文本占位符 3"/>
           <p:cNvSpPr>
-            <a:spLocks noGrp="true"/>
+            <a:spLocks noGrp="1"/>
           </p:cNvSpPr>
           <p:nvPr>
             <p:ph type="body" idx="2"/>
@@ -2340,7 +2341,7 @@
         <p:nvSpPr>
           <p:cNvPr id="61" name="日期占位符 4"/>
           <p:cNvSpPr>
-            <a:spLocks noGrp="true"/>
+            <a:spLocks noGrp="1"/>
           </p:cNvSpPr>
           <p:nvPr>
             <p:ph type="dt" idx="10"/>
@@ -2349,11 +2350,11 @@
         <p:spPr/>
         <p:txBody>
           <a:bodyPr/>
-          <a:p>
-            <a:pPr/>
+          <a:lstStyle/>
+          <a:p>
             <a:fld id="{4E233BD8-DB7E-4E6E-9456-6D1E77C88269}" type="datetime1">
-              <a:rPr lang="zh-CN"/>
-              <a:t>2022/12/22</a:t>
+              <a:rPr lang="en-US" altLang="zh-CN"/>
+              <a:t>2025/12/16</a:t>
             </a:fld>
             <a:endParaRPr lang="zh-CN"/>
           </a:p>
@@ -2363,7 +2364,7 @@
         <p:nvSpPr>
           <p:cNvPr id="62" name="页脚占位符 5"/>
           <p:cNvSpPr>
-            <a:spLocks noGrp="true"/>
+            <a:spLocks noGrp="1"/>
           </p:cNvSpPr>
           <p:nvPr>
             <p:ph type="ftr" idx="11"/>
@@ -2372,8 +2373,8 @@
         <p:spPr/>
         <p:txBody>
           <a:bodyPr/>
-          <a:p>
-            <a:pPr/>
+          <a:lstStyle/>
+          <a:p>
             <a:endParaRPr lang="zh-CN"/>
           </a:p>
         </p:txBody>
@@ -2382,7 +2383,7 @@
         <p:nvSpPr>
           <p:cNvPr id="63" name="灯片编号占位符 6"/>
           <p:cNvSpPr>
-            <a:spLocks noGrp="true"/>
+            <a:spLocks noGrp="1"/>
           </p:cNvSpPr>
           <p:nvPr>
             <p:ph type="sldNum" idx="12"/>
@@ -2391,8 +2392,8 @@
         <p:spPr/>
         <p:txBody>
           <a:bodyPr/>
-          <a:p>
-            <a:pPr/>
+          <a:lstStyle/>
+          <a:p>
             <a:fld id="{747CCC7F-E1A2-469B-A337-764C3DF07313}" type="slidenum">
               <a:rPr lang="zh-CN"/>
               <a:t>‹#›</a:t>
@@ -2410,13 +2411,14 @@
 </file>
 
 <file path=ppt/slideMasters/slideMaster1.xml><?xml version="1.0" encoding="utf-8"?>
-<p:sldMaster xmlns:a="http://schemas.openxmlformats.org/drawingml/2006/main" xmlns:p="http://schemas.openxmlformats.org/presentationml/2006/main" xmlns:r="http://schemas.openxmlformats.org/officeDocument/2006/relationships">
+<p:sldMaster xmlns:a="http://schemas.openxmlformats.org/drawingml/2006/main" xmlns:r="http://schemas.openxmlformats.org/officeDocument/2006/relationships" xmlns:p="http://schemas.openxmlformats.org/presentationml/2006/main">
   <p:cSld>
     <p:bg>
       <p:bgPr>
         <a:solidFill>
           <a:schemeClr val="bg1"/>
         </a:solidFill>
+        <a:effectLst/>
       </p:bgPr>
     </p:bg>
     <p:spTree>
@@ -2437,7 +2439,7 @@
         <p:nvSpPr>
           <p:cNvPr id="2" name="标题占位符 1"/>
           <p:cNvSpPr>
-            <a:spLocks noGrp="true"/>
+            <a:spLocks noGrp="1"/>
           </p:cNvSpPr>
           <p:nvPr>
             <p:ph type="title"/>
@@ -2448,14 +2450,16 @@
             <a:off x="838200" y="365125"/>
             <a:ext cx="10515600" cy="1325563"/>
           </a:xfrm>
-          <a:prstGeom prst="rect"/>
+          <a:prstGeom prst="rect">
+            <a:avLst/>
+          </a:prstGeom>
         </p:spPr>
         <p:txBody>
           <a:bodyPr vert="horz" lIns="91440" tIns="45720" rIns="91440" bIns="45720" anchor="ctr">
             <a:normAutofit/>
           </a:bodyPr>
-          <a:p>
-            <a:pPr/>
+          <a:lstStyle/>
+          <a:p>
             <a:r>
               <a:rPr lang="zh-CN"/>
               <a:t>单击此处编辑母版标题样式</a:t>
@@ -2468,7 +2472,7 @@
         <p:nvSpPr>
           <p:cNvPr id="3" name="文本占位符 2"/>
           <p:cNvSpPr>
-            <a:spLocks noGrp="true"/>
+            <a:spLocks noGrp="1"/>
           </p:cNvSpPr>
           <p:nvPr>
             <p:ph type="body" idx="1"/>
@@ -2479,12 +2483,15 @@
             <a:off x="838200" y="1825625"/>
             <a:ext cx="10515600" cy="4351338"/>
           </a:xfrm>
-          <a:prstGeom prst="rect"/>
+          <a:prstGeom prst="rect">
+            <a:avLst/>
+          </a:prstGeom>
         </p:spPr>
         <p:txBody>
           <a:bodyPr vert="horz" lIns="91440" tIns="45720" rIns="91440" bIns="45720">
             <a:normAutofit/>
           </a:bodyPr>
+          <a:lstStyle/>
           <a:p>
             <a:pPr lvl="0"/>
             <a:r>
@@ -2531,7 +2538,7 @@
         <p:nvSpPr>
           <p:cNvPr id="4" name="日期占位符 3"/>
           <p:cNvSpPr>
-            <a:spLocks noGrp="true"/>
+            <a:spLocks noGrp="1"/>
           </p:cNvSpPr>
           <p:nvPr>
             <p:ph type="dt" idx="2"/>
@@ -2542,7 +2549,9 @@
             <a:off x="838200" y="6356350"/>
             <a:ext cx="2743200" cy="365125"/>
           </a:xfrm>
-          <a:prstGeom prst="rect"/>
+          <a:prstGeom prst="rect">
+            <a:avLst/>
+          </a:prstGeom>
         </p:spPr>
         <p:txBody>
           <a:bodyPr vert="horz" lIns="91440" tIns="45720" rIns="91440" bIns="45720" anchor="ctr"/>
@@ -2558,10 +2567,9 @@
             </a:lvl1pPr>
           </a:lstStyle>
           <a:p>
-            <a:pPr/>
             <a:fld id="{C14ADBE2-30DF-480B-A5CC-C216012A8DE2}" type="datetime1">
-              <a:rPr lang="zh-CN"/>
-              <a:t>2022/12/22</a:t>
+              <a:rPr lang="en-US" altLang="zh-CN"/>
+              <a:t>2025/12/16</a:t>
             </a:fld>
             <a:endParaRPr lang="zh-CN"/>
           </a:p>
@@ -2571,7 +2579,7 @@
         <p:nvSpPr>
           <p:cNvPr id="5" name="页脚占位符 4"/>
           <p:cNvSpPr>
-            <a:spLocks noGrp="true"/>
+            <a:spLocks noGrp="1"/>
           </p:cNvSpPr>
           <p:nvPr>
             <p:ph type="ftr" idx="3"/>
@@ -2582,7 +2590,9 @@
             <a:off x="4038600" y="6356350"/>
             <a:ext cx="4114800" cy="365125"/>
           </a:xfrm>
-          <a:prstGeom prst="rect"/>
+          <a:prstGeom prst="rect">
+            <a:avLst/>
+          </a:prstGeom>
         </p:spPr>
         <p:txBody>
           <a:bodyPr vert="horz" lIns="91440" tIns="45720" rIns="91440" bIns="45720" anchor="ctr"/>
@@ -2598,7 +2608,6 @@
             </a:lvl1pPr>
           </a:lstStyle>
           <a:p>
-            <a:pPr/>
             <a:endParaRPr lang="zh-CN"/>
           </a:p>
         </p:txBody>
@@ -2607,7 +2616,7 @@
         <p:nvSpPr>
           <p:cNvPr id="6" name="灯片编号占位符 5"/>
           <p:cNvSpPr>
-            <a:spLocks noGrp="true"/>
+            <a:spLocks noGrp="1"/>
           </p:cNvSpPr>
           <p:nvPr>
             <p:ph type="sldNum" idx="4"/>
@@ -2618,7 +2627,9 @@
             <a:off x="8610600" y="6356350"/>
             <a:ext cx="2743200" cy="365125"/>
           </a:xfrm>
-          <a:prstGeom prst="rect"/>
+          <a:prstGeom prst="rect">
+            <a:avLst/>
+          </a:prstGeom>
         </p:spPr>
         <p:txBody>
           <a:bodyPr vert="horz" lIns="91440" tIns="45720" rIns="91440" bIns="45720" anchor="ctr"/>
@@ -2634,7 +2645,6 @@
             </a:lvl1pPr>
           </a:lstStyle>
           <a:p>
-            <a:pPr/>
             <a:fld id="{DD09DED9-3562-4003-9ED4-F9F7C2DA97F0}" type="slidenum">
               <a:rPr lang="zh-CN"/>
               <a:t>‹#›</a:t>
@@ -2647,17 +2657,17 @@
   </p:cSld>
   <p:clrMap bg1="lt1" tx1="dk1" bg2="lt2" tx2="dk2" accent1="accent1" accent2="accent2" accent3="accent3" accent4="accent4" accent5="accent5" accent6="accent6" hlink="hlink" folHlink="folHlink"/>
   <p:sldLayoutIdLst>
-    <p:sldLayoutId id="2147483649" r:id="rId0"/>
-    <p:sldLayoutId id="2147483650" r:id="rId1"/>
-    <p:sldLayoutId id="2147483651" r:id="rId2"/>
-    <p:sldLayoutId id="2147483652" r:id="rId3"/>
-    <p:sldLayoutId id="2147483653" r:id="rId4"/>
-    <p:sldLayoutId id="2147483654" r:id="rId5"/>
-    <p:sldLayoutId id="2147483655" r:id="rId6"/>
-    <p:sldLayoutId id="2147483656" r:id="rId7"/>
-    <p:sldLayoutId id="2147483657" r:id="rId8"/>
-    <p:sldLayoutId id="2147483658" r:id="rId9"/>
-    <p:sldLayoutId id="2147483659" r:id="rId10"/>
+    <p:sldLayoutId id="2147483649" r:id="rId1"/>
+    <p:sldLayoutId id="2147483650" r:id="rId2"/>
+    <p:sldLayoutId id="2147483651" r:id="rId3"/>
+    <p:sldLayoutId id="2147483652" r:id="rId4"/>
+    <p:sldLayoutId id="2147483653" r:id="rId5"/>
+    <p:sldLayoutId id="2147483654" r:id="rId6"/>
+    <p:sldLayoutId id="2147483655" r:id="rId7"/>
+    <p:sldLayoutId id="2147483656" r:id="rId8"/>
+    <p:sldLayoutId id="2147483657" r:id="rId9"/>
+    <p:sldLayoutId id="2147483658" r:id="rId10"/>
+    <p:sldLayoutId id="2147483659" r:id="rId11"/>
   </p:sldLayoutIdLst>
   <p:txStyles>
     <p:titleStyle>
@@ -2948,7 +2958,7 @@
 </file>
 
 <file path=ppt/slides/slide1.xml><?xml version="1.0" encoding="utf-8"?>
-<p:sld xmlns:a="http://schemas.openxmlformats.org/drawingml/2006/main" xmlns:p="http://schemas.openxmlformats.org/presentationml/2006/main" xmlns:r="http://schemas.openxmlformats.org/officeDocument/2006/relationships">
+<p:sld xmlns:a="http://schemas.openxmlformats.org/drawingml/2006/main" xmlns:r="http://schemas.openxmlformats.org/officeDocument/2006/relationships" xmlns:p="http://schemas.openxmlformats.org/presentationml/2006/main">
   <p:cSld>
     <p:spTree>
       <p:nvGrpSpPr>
@@ -2966,14 +2976,14 @@
       </p:grpSpPr>
       <p:pic>
         <p:nvPicPr>
-          <p:cNvPr id="2" name=""/>
+          <p:cNvPr id="2" name="图片 1"/>
           <p:cNvPicPr>
-            <a:picLocks noChangeAspect="true"/>
+            <a:picLocks noChangeAspect="1"/>
           </p:cNvPicPr>
           <p:nvPr/>
         </p:nvPicPr>
         <p:blipFill>
-          <a:blip r:embed="rId1"/>
+          <a:blip r:embed="rId2"/>
           <a:stretch>
             <a:fillRect/>
           </a:stretch>
@@ -2983,7 +2993,9 @@
             <a:off x="0" y="0"/>
             <a:ext cx="12192000" cy="6858000"/>
           </a:xfrm>
-          <a:prstGeom prst="rect"/>
+          <a:prstGeom prst="rect">
+            <a:avLst/>
+          </a:prstGeom>
         </p:spPr>
       </p:pic>
     </p:spTree>
@@ -2995,11 +3007,11 @@
 </file>
 
 <file path=ppt/slides/slide2.xml><?xml version="1.0" encoding="utf-8"?>
-<p:sld xmlns:a="http://schemas.openxmlformats.org/drawingml/2006/main" xmlns:p="http://schemas.openxmlformats.org/presentationml/2006/main" xmlns:r="http://schemas.openxmlformats.org/officeDocument/2006/relationships">
+<p:sld xmlns:a="http://schemas.openxmlformats.org/drawingml/2006/main" xmlns:r="http://schemas.openxmlformats.org/officeDocument/2006/relationships" xmlns:p="http://schemas.openxmlformats.org/presentationml/2006/main">
   <p:cSld>
     <p:spTree>
       <p:nvGrpSpPr>
-        <p:cNvPr id="3" name=""/>
+        <p:cNvPr id="1" name=""/>
         <p:cNvGrpSpPr/>
         <p:nvPr/>
       </p:nvGrpSpPr>
@@ -3015,7 +3027,7 @@
         <p:nvSpPr>
           <p:cNvPr id="4" name="标题 1"/>
           <p:cNvSpPr>
-            <a:spLocks noGrp="true"/>
+            <a:spLocks noGrp="1"/>
           </p:cNvSpPr>
           <p:nvPr>
             <p:ph type="title"/>
@@ -3024,8 +3036,8 @@
         <p:spPr/>
         <p:txBody>
           <a:bodyPr/>
-          <a:p>
-            <a:pPr/>
+          <a:lstStyle/>
+          <a:p>
             <a:endParaRPr/>
           </a:p>
         </p:txBody>
@@ -3034,7 +3046,7 @@
         <p:nvSpPr>
           <p:cNvPr id="5" name="内容占位符 2"/>
           <p:cNvSpPr>
-            <a:spLocks noGrp="true"/>
+            <a:spLocks noGrp="1"/>
           </p:cNvSpPr>
           <p:nvPr>
             <p:ph idx="1"/>
@@ -3043,22 +3055,22 @@
         <p:spPr/>
         <p:txBody>
           <a:bodyPr/>
-          <a:p>
-            <a:pPr/>
+          <a:lstStyle/>
+          <a:p>
             <a:endParaRPr/>
           </a:p>
         </p:txBody>
       </p:sp>
       <p:pic>
         <p:nvPicPr>
-          <p:cNvPr id="6" name=""/>
+          <p:cNvPr id="6" name="图片 5"/>
           <p:cNvPicPr>
-            <a:picLocks noChangeAspect="true"/>
+            <a:picLocks noChangeAspect="1"/>
           </p:cNvPicPr>
           <p:nvPr/>
         </p:nvPicPr>
         <p:blipFill>
-          <a:blip r:embed="rId1"/>
+          <a:blip r:embed="rId2"/>
           <a:stretch>
             <a:fillRect/>
           </a:stretch>
@@ -3068,20 +3080,25 @@
             <a:off x="0" y="0"/>
             <a:ext cx="12192000" cy="6858000"/>
           </a:xfrm>
-          <a:prstGeom prst="rect"/>
+          <a:prstGeom prst="rect">
+            <a:avLst/>
+          </a:prstGeom>
         </p:spPr>
       </p:pic>
     </p:spTree>
   </p:cSld>
+  <p:clrMapOvr>
+    <a:masterClrMapping/>
+  </p:clrMapOvr>
 </p:sld>
 </file>
 
 <file path=ppt/slides/slide3.xml><?xml version="1.0" encoding="utf-8"?>
-<p:sld xmlns:a="http://schemas.openxmlformats.org/drawingml/2006/main" xmlns:p="http://schemas.openxmlformats.org/presentationml/2006/main" xmlns:r="http://schemas.openxmlformats.org/officeDocument/2006/relationships">
+<p:sld xmlns:a="http://schemas.openxmlformats.org/drawingml/2006/main" xmlns:r="http://schemas.openxmlformats.org/officeDocument/2006/relationships" xmlns:p="http://schemas.openxmlformats.org/presentationml/2006/main">
   <p:cSld>
     <p:spTree>
       <p:nvGrpSpPr>
-        <p:cNvPr id="7" name=""/>
+        <p:cNvPr id="1" name=""/>
         <p:cNvGrpSpPr/>
         <p:nvPr/>
       </p:nvGrpSpPr>
@@ -3097,7 +3114,7 @@
         <p:nvSpPr>
           <p:cNvPr id="8" name="标题 1"/>
           <p:cNvSpPr>
-            <a:spLocks noGrp="true"/>
+            <a:spLocks noGrp="1"/>
           </p:cNvSpPr>
           <p:nvPr>
             <p:ph type="title"/>
@@ -3106,8 +3123,8 @@
         <p:spPr/>
         <p:txBody>
           <a:bodyPr/>
-          <a:p>
-            <a:pPr/>
+          <a:lstStyle/>
+          <a:p>
             <a:endParaRPr/>
           </a:p>
         </p:txBody>
@@ -3116,7 +3133,7 @@
         <p:nvSpPr>
           <p:cNvPr id="9" name="内容占位符 2"/>
           <p:cNvSpPr>
-            <a:spLocks noGrp="true"/>
+            <a:spLocks noGrp="1"/>
           </p:cNvSpPr>
           <p:nvPr>
             <p:ph idx="1"/>
@@ -3125,22 +3142,22 @@
         <p:spPr/>
         <p:txBody>
           <a:bodyPr/>
-          <a:p>
-            <a:pPr/>
+          <a:lstStyle/>
+          <a:p>
             <a:endParaRPr/>
           </a:p>
         </p:txBody>
       </p:sp>
       <p:pic>
         <p:nvPicPr>
-          <p:cNvPr id="10" name=""/>
+          <p:cNvPr id="10" name="图片 9"/>
           <p:cNvPicPr>
-            <a:picLocks noChangeAspect="true"/>
+            <a:picLocks noChangeAspect="1"/>
           </p:cNvPicPr>
           <p:nvPr/>
         </p:nvPicPr>
         <p:blipFill>
-          <a:blip r:embed="rId1"/>
+          <a:blip r:embed="rId2"/>
           <a:stretch>
             <a:fillRect/>
           </a:stretch>
@@ -3150,20 +3167,25 @@
             <a:off x="0" y="0"/>
             <a:ext cx="12192000" cy="6858000"/>
           </a:xfrm>
-          <a:prstGeom prst="rect"/>
+          <a:prstGeom prst="rect">
+            <a:avLst/>
+          </a:prstGeom>
         </p:spPr>
       </p:pic>
     </p:spTree>
   </p:cSld>
+  <p:clrMapOvr>
+    <a:masterClrMapping/>
+  </p:clrMapOvr>
 </p:sld>
 </file>
 
 <file path=ppt/slides/slide4.xml><?xml version="1.0" encoding="utf-8"?>
-<p:sld xmlns:a="http://schemas.openxmlformats.org/drawingml/2006/main" xmlns:p="http://schemas.openxmlformats.org/presentationml/2006/main" xmlns:r="http://schemas.openxmlformats.org/officeDocument/2006/relationships">
+<p:sld xmlns:a="http://schemas.openxmlformats.org/drawingml/2006/main" xmlns:r="http://schemas.openxmlformats.org/officeDocument/2006/relationships" xmlns:p="http://schemas.openxmlformats.org/presentationml/2006/main">
   <p:cSld>
     <p:spTree>
       <p:nvGrpSpPr>
-        <p:cNvPr id="11" name=""/>
+        <p:cNvPr id="1" name=""/>
         <p:cNvGrpSpPr/>
         <p:nvPr/>
       </p:nvGrpSpPr>
@@ -3179,7 +3201,7 @@
         <p:nvSpPr>
           <p:cNvPr id="12" name="标题 1"/>
           <p:cNvSpPr>
-            <a:spLocks noGrp="true"/>
+            <a:spLocks noGrp="1"/>
           </p:cNvSpPr>
           <p:nvPr>
             <p:ph type="title"/>
@@ -3188,8 +3210,8 @@
         <p:spPr/>
         <p:txBody>
           <a:bodyPr/>
-          <a:p>
-            <a:pPr/>
+          <a:lstStyle/>
+          <a:p>
             <a:endParaRPr/>
           </a:p>
         </p:txBody>
@@ -3198,7 +3220,7 @@
         <p:nvSpPr>
           <p:cNvPr id="13" name="内容占位符 2"/>
           <p:cNvSpPr>
-            <a:spLocks noGrp="true"/>
+            <a:spLocks noGrp="1"/>
           </p:cNvSpPr>
           <p:nvPr>
             <p:ph idx="1"/>
@@ -3207,22 +3229,22 @@
         <p:spPr/>
         <p:txBody>
           <a:bodyPr/>
-          <a:p>
-            <a:pPr/>
+          <a:lstStyle/>
+          <a:p>
             <a:endParaRPr/>
           </a:p>
         </p:txBody>
       </p:sp>
       <p:pic>
         <p:nvPicPr>
-          <p:cNvPr id="14" name=""/>
+          <p:cNvPr id="14" name="图片 13"/>
           <p:cNvPicPr>
-            <a:picLocks noChangeAspect="true"/>
+            <a:picLocks noChangeAspect="1"/>
           </p:cNvPicPr>
           <p:nvPr/>
         </p:nvPicPr>
         <p:blipFill>
-          <a:blip r:embed="rId1"/>
+          <a:blip r:embed="rId2"/>
           <a:stretch>
             <a:fillRect/>
           </a:stretch>
@@ -3232,20 +3254,25 @@
             <a:off x="0" y="0"/>
             <a:ext cx="12192000" cy="6858000"/>
           </a:xfrm>
-          <a:prstGeom prst="rect"/>
+          <a:prstGeom prst="rect">
+            <a:avLst/>
+          </a:prstGeom>
         </p:spPr>
       </p:pic>
     </p:spTree>
   </p:cSld>
+  <p:clrMapOvr>
+    <a:masterClrMapping/>
+  </p:clrMapOvr>
 </p:sld>
 </file>
 
 <file path=ppt/slides/slide5.xml><?xml version="1.0" encoding="utf-8"?>
-<p:sld xmlns:a="http://schemas.openxmlformats.org/drawingml/2006/main" xmlns:p="http://schemas.openxmlformats.org/presentationml/2006/main" xmlns:r="http://schemas.openxmlformats.org/officeDocument/2006/relationships">
+<p:sld xmlns:a="http://schemas.openxmlformats.org/drawingml/2006/main" xmlns:r="http://schemas.openxmlformats.org/officeDocument/2006/relationships" xmlns:p="http://schemas.openxmlformats.org/presentationml/2006/main">
   <p:cSld>
     <p:spTree>
       <p:nvGrpSpPr>
-        <p:cNvPr id="15" name=""/>
+        <p:cNvPr id="1" name=""/>
         <p:cNvGrpSpPr/>
         <p:nvPr/>
       </p:nvGrpSpPr>
@@ -3261,7 +3288,7 @@
         <p:nvSpPr>
           <p:cNvPr id="16" name="标题 1"/>
           <p:cNvSpPr>
-            <a:spLocks noGrp="true"/>
+            <a:spLocks noGrp="1"/>
           </p:cNvSpPr>
           <p:nvPr>
             <p:ph type="title"/>
@@ -3270,8 +3297,8 @@
         <p:spPr/>
         <p:txBody>
           <a:bodyPr/>
-          <a:p>
-            <a:pPr/>
+          <a:lstStyle/>
+          <a:p>
             <a:endParaRPr/>
           </a:p>
         </p:txBody>
@@ -3280,7 +3307,7 @@
         <p:nvSpPr>
           <p:cNvPr id="17" name="内容占位符 2"/>
           <p:cNvSpPr>
-            <a:spLocks noGrp="true"/>
+            <a:spLocks noGrp="1"/>
           </p:cNvSpPr>
           <p:nvPr>
             <p:ph idx="1"/>
@@ -3289,22 +3316,22 @@
         <p:spPr/>
         <p:txBody>
           <a:bodyPr/>
-          <a:p>
-            <a:pPr/>
+          <a:lstStyle/>
+          <a:p>
             <a:endParaRPr/>
           </a:p>
         </p:txBody>
       </p:sp>
       <p:pic>
         <p:nvPicPr>
-          <p:cNvPr id="18" name=""/>
+          <p:cNvPr id="18" name="图片 17"/>
           <p:cNvPicPr>
-            <a:picLocks noChangeAspect="true"/>
+            <a:picLocks noChangeAspect="1"/>
           </p:cNvPicPr>
           <p:nvPr/>
         </p:nvPicPr>
         <p:blipFill>
-          <a:blip r:embed="rId1"/>
+          <a:blip r:embed="rId2"/>
           <a:stretch>
             <a:fillRect/>
           </a:stretch>
@@ -3314,20 +3341,25 @@
             <a:off x="0" y="0"/>
             <a:ext cx="12192000" cy="6858000"/>
           </a:xfrm>
-          <a:prstGeom prst="rect"/>
+          <a:prstGeom prst="rect">
+            <a:avLst/>
+          </a:prstGeom>
         </p:spPr>
       </p:pic>
     </p:spTree>
   </p:cSld>
+  <p:clrMapOvr>
+    <a:masterClrMapping/>
+  </p:clrMapOvr>
 </p:sld>
 </file>
 
 <file path=ppt/slides/slide6.xml><?xml version="1.0" encoding="utf-8"?>
-<p:sld xmlns:a="http://schemas.openxmlformats.org/drawingml/2006/main" xmlns:p="http://schemas.openxmlformats.org/presentationml/2006/main" xmlns:r="http://schemas.openxmlformats.org/officeDocument/2006/relationships">
+<p:sld xmlns:a="http://schemas.openxmlformats.org/drawingml/2006/main" xmlns:r="http://schemas.openxmlformats.org/officeDocument/2006/relationships" xmlns:p="http://schemas.openxmlformats.org/presentationml/2006/main">
   <p:cSld>
     <p:spTree>
       <p:nvGrpSpPr>
-        <p:cNvPr id="19" name=""/>
+        <p:cNvPr id="1" name=""/>
         <p:cNvGrpSpPr/>
         <p:nvPr/>
       </p:nvGrpSpPr>
@@ -3343,7 +3375,7 @@
         <p:nvSpPr>
           <p:cNvPr id="20" name="标题 1"/>
           <p:cNvSpPr>
-            <a:spLocks noGrp="true"/>
+            <a:spLocks noGrp="1"/>
           </p:cNvSpPr>
           <p:nvPr>
             <p:ph type="title"/>
@@ -3352,8 +3384,8 @@
         <p:spPr/>
         <p:txBody>
           <a:bodyPr/>
-          <a:p>
-            <a:pPr/>
+          <a:lstStyle/>
+          <a:p>
             <a:endParaRPr/>
           </a:p>
         </p:txBody>
@@ -3362,7 +3394,7 @@
         <p:nvSpPr>
           <p:cNvPr id="21" name="内容占位符 2"/>
           <p:cNvSpPr>
-            <a:spLocks noGrp="true"/>
+            <a:spLocks noGrp="1"/>
           </p:cNvSpPr>
           <p:nvPr>
             <p:ph idx="1"/>
@@ -3371,22 +3403,22 @@
         <p:spPr/>
         <p:txBody>
           <a:bodyPr/>
-          <a:p>
-            <a:pPr/>
+          <a:lstStyle/>
+          <a:p>
             <a:endParaRPr/>
           </a:p>
         </p:txBody>
       </p:sp>
       <p:pic>
         <p:nvPicPr>
-          <p:cNvPr id="22" name=""/>
+          <p:cNvPr id="22" name="图片 21"/>
           <p:cNvPicPr>
-            <a:picLocks noChangeAspect="true"/>
+            <a:picLocks noChangeAspect="1"/>
           </p:cNvPicPr>
           <p:nvPr/>
         </p:nvPicPr>
         <p:blipFill>
-          <a:blip r:embed="rId1"/>
+          <a:blip r:embed="rId2"/>
           <a:stretch>
             <a:fillRect/>
           </a:stretch>
@@ -3396,20 +3428,25 @@
             <a:off x="0" y="0"/>
             <a:ext cx="12192000" cy="6858000"/>
           </a:xfrm>
-          <a:prstGeom prst="rect"/>
+          <a:prstGeom prst="rect">
+            <a:avLst/>
+          </a:prstGeom>
         </p:spPr>
       </p:pic>
     </p:spTree>
   </p:cSld>
+  <p:clrMapOvr>
+    <a:masterClrMapping/>
+  </p:clrMapOvr>
 </p:sld>
 </file>
 
 <file path=ppt/slides/slide7.xml><?xml version="1.0" encoding="utf-8"?>
-<p:sld xmlns:a="http://schemas.openxmlformats.org/drawingml/2006/main" xmlns:p="http://schemas.openxmlformats.org/presentationml/2006/main" xmlns:r="http://schemas.openxmlformats.org/officeDocument/2006/relationships">
+<p:sld xmlns:a="http://schemas.openxmlformats.org/drawingml/2006/main" xmlns:r="http://schemas.openxmlformats.org/officeDocument/2006/relationships" xmlns:p="http://schemas.openxmlformats.org/presentationml/2006/main">
   <p:cSld>
     <p:spTree>
       <p:nvGrpSpPr>
-        <p:cNvPr id="23" name=""/>
+        <p:cNvPr id="1" name=""/>
         <p:cNvGrpSpPr/>
         <p:nvPr/>
       </p:nvGrpSpPr>
@@ -3425,7 +3462,7 @@
         <p:nvSpPr>
           <p:cNvPr id="24" name="标题 1"/>
           <p:cNvSpPr>
-            <a:spLocks noGrp="true"/>
+            <a:spLocks noGrp="1"/>
           </p:cNvSpPr>
           <p:nvPr>
             <p:ph type="title"/>
@@ -3434,8 +3471,8 @@
         <p:spPr/>
         <p:txBody>
           <a:bodyPr/>
-          <a:p>
-            <a:pPr/>
+          <a:lstStyle/>
+          <a:p>
             <a:endParaRPr/>
           </a:p>
         </p:txBody>
@@ -3444,7 +3481,7 @@
         <p:nvSpPr>
           <p:cNvPr id="25" name="内容占位符 2"/>
           <p:cNvSpPr>
-            <a:spLocks noGrp="true"/>
+            <a:spLocks noGrp="1"/>
           </p:cNvSpPr>
           <p:nvPr>
             <p:ph idx="1"/>
@@ -3453,22 +3490,22 @@
         <p:spPr/>
         <p:txBody>
           <a:bodyPr/>
-          <a:p>
-            <a:pPr/>
+          <a:lstStyle/>
+          <a:p>
             <a:endParaRPr/>
           </a:p>
         </p:txBody>
       </p:sp>
       <p:pic>
         <p:nvPicPr>
-          <p:cNvPr id="26" name=""/>
+          <p:cNvPr id="26" name="图片 25"/>
           <p:cNvPicPr>
-            <a:picLocks noChangeAspect="true"/>
+            <a:picLocks noChangeAspect="1"/>
           </p:cNvPicPr>
           <p:nvPr/>
         </p:nvPicPr>
         <p:blipFill>
-          <a:blip r:embed="rId1"/>
+          <a:blip r:embed="rId2"/>
           <a:stretch>
             <a:fillRect/>
           </a:stretch>
@@ -3478,11 +3515,16 @@
             <a:off x="0" y="0"/>
             <a:ext cx="12192000" cy="6858000"/>
           </a:xfrm>
-          <a:prstGeom prst="rect"/>
+          <a:prstGeom prst="rect">
+            <a:avLst/>
+          </a:prstGeom>
         </p:spPr>
       </p:pic>
     </p:spTree>
   </p:cSld>
+  <p:clrMapOvr>
+    <a:masterClrMapping/>
+  </p:clrMapOvr>
 </p:sld>
 </file>
 
@@ -3544,7 +3586,7 @@
         <a:solidFill>
           <a:schemeClr val="phClr"/>
         </a:solidFill>
-        <a:gradFill rotWithShape="true">
+        <a:gradFill rotWithShape="1">
           <a:gsLst>
             <a:gs pos="0">
               <a:schemeClr val="phClr">
@@ -3568,9 +3610,9 @@
               </a:schemeClr>
             </a:gs>
           </a:gsLst>
-          <a:lin ang="5400000" scaled="false"/>
+          <a:lin ang="5400000" scaled="0"/>
         </a:gradFill>
-        <a:gradFill rotWithShape="true">
+        <a:gradFill rotWithShape="1">
           <a:gsLst>
             <a:gs pos="0">
               <a:schemeClr val="phClr">
@@ -3594,7 +3636,7 @@
               </a:schemeClr>
             </a:gs>
           </a:gsLst>
-          <a:lin ang="5400000" scaled="false"/>
+          <a:lin ang="5400000" scaled="0"/>
         </a:gradFill>
       </a:fillStyleLst>
       <a:lnStyleLst>
@@ -3629,7 +3671,7 @@
         </a:effectStyle>
         <a:effectStyle>
           <a:effectLst>
-            <a:outerShdw blurRad="57150" dist="19050" dir="5400000" algn="ctr" rotWithShape="false">
+            <a:outerShdw blurRad="57150" dist="19050" dir="5400000" algn="ctr" rotWithShape="0">
               <a:srgbClr val="000000">
                 <a:alpha val="63000"/>
               </a:srgbClr>
@@ -3647,7 +3689,7 @@
             <a:satMod val="170000"/>
           </a:schemeClr>
         </a:solidFill>
-        <a:gradFill rotWithShape="true">
+        <a:gradFill rotWithShape="1">
           <a:gsLst>
             <a:gs pos="0">
               <a:schemeClr val="phClr">
@@ -3672,10 +3714,12 @@
               </a:schemeClr>
             </a:gs>
           </a:gsLst>
-          <a:lin ang="5400000" scaled="false"/>
+          <a:lin ang="5400000" scaled="0"/>
         </a:gradFill>
       </a:bgFillStyleLst>
     </a:fmtScheme>
   </a:themeElements>
+  <a:objectDefaults/>
+  <a:extraClrSchemeLst/>
 </a:theme>
 </file>
</xml_diff>